<commit_message>
Pfeil hinzugefügt in Präsi
</commit_message>
<xml_diff>
--- a/Git_Tutorial_for_beginners.pptx
+++ b/Git_Tutorial_for_beginners.pptx
@@ -110,6 +110,11 @@
       </a:defRPr>
     </a:lvl9pPr>
   </p:defaultTextStyle>
+  <p:extLst>
+    <p:ext uri="{EFAFB233-063F-42B5-8137-9DF3F51BA10A}">
+      <p15:sldGuideLst xmlns:p15="http://schemas.microsoft.com/office/powerpoint/2012/main"/>
+    </p:ext>
+  </p:extLst>
 </p:presentation>
 </file>
 
@@ -195,7 +200,7 @@
           <a:p>
             <a:fld id="{6121CC06-38EA-4795-B07F-571277A52CDE}" type="datetimeFigureOut">
               <a:rPr lang="de-DE" smtClean="0"/>
-              <a:t>14.07.2022</a:t>
+              <a:t>15.07.2022</a:t>
             </a:fld>
             <a:endParaRPr lang="de-DE"/>
           </a:p>
@@ -859,7 +864,7 @@
           <a:p>
             <a:fld id="{DECE98D8-B657-47C7-81B0-9E8D7A01D195}" type="datetimeFigureOut">
               <a:rPr lang="de-DE" smtClean="0"/>
-              <a:t>14.07.2022</a:t>
+              <a:t>15.07.2022</a:t>
             </a:fld>
             <a:endParaRPr lang="de-DE"/>
           </a:p>
@@ -1193,7 +1198,7 @@
           <a:p>
             <a:fld id="{DECE98D8-B657-47C7-81B0-9E8D7A01D195}" type="datetimeFigureOut">
               <a:rPr lang="de-DE" smtClean="0"/>
-              <a:t>14.07.2022</a:t>
+              <a:t>15.07.2022</a:t>
             </a:fld>
             <a:endParaRPr lang="de-DE"/>
           </a:p>
@@ -1471,7 +1476,7 @@
           <a:p>
             <a:fld id="{DECE98D8-B657-47C7-81B0-9E8D7A01D195}" type="datetimeFigureOut">
               <a:rPr lang="de-DE" smtClean="0"/>
-              <a:t>14.07.2022</a:t>
+              <a:t>15.07.2022</a:t>
             </a:fld>
             <a:endParaRPr lang="de-DE"/>
           </a:p>
@@ -2039,7 +2044,7 @@
           <a:p>
             <a:fld id="{DECE98D8-B657-47C7-81B0-9E8D7A01D195}" type="datetimeFigureOut">
               <a:rPr lang="de-DE" smtClean="0"/>
-              <a:t>14.07.2022</a:t>
+              <a:t>15.07.2022</a:t>
             </a:fld>
             <a:endParaRPr lang="de-DE"/>
           </a:p>
@@ -2317,7 +2322,7 @@
           <a:p>
             <a:fld id="{DECE98D8-B657-47C7-81B0-9E8D7A01D195}" type="datetimeFigureOut">
               <a:rPr lang="de-DE" smtClean="0"/>
-              <a:t>14.07.2022</a:t>
+              <a:t>15.07.2022</a:t>
             </a:fld>
             <a:endParaRPr lang="de-DE"/>
           </a:p>
@@ -2879,7 +2884,7 @@
           <a:p>
             <a:fld id="{DECE98D8-B657-47C7-81B0-9E8D7A01D195}" type="datetimeFigureOut">
               <a:rPr lang="de-DE" smtClean="0"/>
-              <a:t>14.07.2022</a:t>
+              <a:t>15.07.2022</a:t>
             </a:fld>
             <a:endParaRPr lang="de-DE"/>
           </a:p>
@@ -3206,7 +3211,7 @@
           <a:p>
             <a:fld id="{DECE98D8-B657-47C7-81B0-9E8D7A01D195}" type="datetimeFigureOut">
               <a:rPr lang="de-DE" smtClean="0"/>
-              <a:t>14.07.2022</a:t>
+              <a:t>15.07.2022</a:t>
             </a:fld>
             <a:endParaRPr lang="de-DE"/>
           </a:p>
@@ -3383,7 +3388,7 @@
           <a:p>
             <a:fld id="{DECE98D8-B657-47C7-81B0-9E8D7A01D195}" type="datetimeFigureOut">
               <a:rPr lang="de-DE" smtClean="0"/>
-              <a:t>14.07.2022</a:t>
+              <a:t>15.07.2022</a:t>
             </a:fld>
             <a:endParaRPr lang="de-DE"/>
           </a:p>
@@ -3621,7 +3626,7 @@
           <a:p>
             <a:fld id="{DECE98D8-B657-47C7-81B0-9E8D7A01D195}" type="datetimeFigureOut">
               <a:rPr lang="de-DE" smtClean="0"/>
-              <a:t>14.07.2022</a:t>
+              <a:t>15.07.2022</a:t>
             </a:fld>
             <a:endParaRPr lang="de-DE"/>
           </a:p>
@@ -3821,7 +3826,7 @@
           <a:p>
             <a:fld id="{DECE98D8-B657-47C7-81B0-9E8D7A01D195}" type="datetimeFigureOut">
               <a:rPr lang="de-DE" smtClean="0"/>
-              <a:t>14.07.2022</a:t>
+              <a:t>15.07.2022</a:t>
             </a:fld>
             <a:endParaRPr lang="de-DE"/>
           </a:p>
@@ -4097,7 +4102,7 @@
           <a:p>
             <a:fld id="{DECE98D8-B657-47C7-81B0-9E8D7A01D195}" type="datetimeFigureOut">
               <a:rPr lang="de-DE" smtClean="0"/>
-              <a:t>14.07.2022</a:t>
+              <a:t>15.07.2022</a:t>
             </a:fld>
             <a:endParaRPr lang="de-DE"/>
           </a:p>
@@ -4363,7 +4368,7 @@
           <a:p>
             <a:fld id="{DECE98D8-B657-47C7-81B0-9E8D7A01D195}" type="datetimeFigureOut">
               <a:rPr lang="de-DE" smtClean="0"/>
-              <a:t>14.07.2022</a:t>
+              <a:t>15.07.2022</a:t>
             </a:fld>
             <a:endParaRPr lang="de-DE"/>
           </a:p>
@@ -4737,7 +4742,7 @@
           <a:p>
             <a:fld id="{DECE98D8-B657-47C7-81B0-9E8D7A01D195}" type="datetimeFigureOut">
               <a:rPr lang="de-DE" smtClean="0"/>
-              <a:t>14.07.2022</a:t>
+              <a:t>15.07.2022</a:t>
             </a:fld>
             <a:endParaRPr lang="de-DE"/>
           </a:p>
@@ -4885,7 +4890,7 @@
           <a:p>
             <a:fld id="{DECE98D8-B657-47C7-81B0-9E8D7A01D195}" type="datetimeFigureOut">
               <a:rPr lang="de-DE" smtClean="0"/>
-              <a:t>14.07.2022</a:t>
+              <a:t>15.07.2022</a:t>
             </a:fld>
             <a:endParaRPr lang="de-DE"/>
           </a:p>
@@ -5010,7 +5015,7 @@
           <a:p>
             <a:fld id="{DECE98D8-B657-47C7-81B0-9E8D7A01D195}" type="datetimeFigureOut">
               <a:rPr lang="de-DE" smtClean="0"/>
-              <a:t>14.07.2022</a:t>
+              <a:t>15.07.2022</a:t>
             </a:fld>
             <a:endParaRPr lang="de-DE"/>
           </a:p>
@@ -5295,7 +5300,7 @@
           <a:p>
             <a:fld id="{DECE98D8-B657-47C7-81B0-9E8D7A01D195}" type="datetimeFigureOut">
               <a:rPr lang="de-DE" smtClean="0"/>
-              <a:t>14.07.2022</a:t>
+              <a:t>15.07.2022</a:t>
             </a:fld>
             <a:endParaRPr lang="de-DE"/>
           </a:p>
@@ -5619,7 +5624,7 @@
           <a:p>
             <a:fld id="{DECE98D8-B657-47C7-81B0-9E8D7A01D195}" type="datetimeFigureOut">
               <a:rPr lang="de-DE" smtClean="0"/>
-              <a:t>14.07.2022</a:t>
+              <a:t>15.07.2022</a:t>
             </a:fld>
             <a:endParaRPr lang="de-DE"/>
           </a:p>
@@ -5833,7 +5838,7 @@
           <a:p>
             <a:fld id="{DECE98D8-B657-47C7-81B0-9E8D7A01D195}" type="datetimeFigureOut">
               <a:rPr lang="de-DE" smtClean="0"/>
-              <a:t>14.07.2022</a:t>
+              <a:t>15.07.2022</a:t>
             </a:fld>
             <a:endParaRPr lang="de-DE"/>
           </a:p>
@@ -7756,6 +7761,49 @@
           <a:xfrm flipH="1" flipV="1">
             <a:off x="2043831" y="2857560"/>
             <a:ext cx="1" cy="255176"/>
+          </a:xfrm>
+          <a:prstGeom prst="straightConnector1">
+            <a:avLst/>
+          </a:prstGeom>
+          <a:ln>
+            <a:tailEnd type="triangle"/>
+          </a:ln>
+        </p:spPr>
+        <p:style>
+          <a:lnRef idx="1">
+            <a:schemeClr val="accent1"/>
+          </a:lnRef>
+          <a:fillRef idx="0">
+            <a:schemeClr val="accent1"/>
+          </a:fillRef>
+          <a:effectRef idx="0">
+            <a:schemeClr val="accent1"/>
+          </a:effectRef>
+          <a:fontRef idx="minor">
+            <a:schemeClr val="tx1"/>
+          </a:fontRef>
+        </p:style>
+      </p:cxnSp>
+      <p:cxnSp>
+        <p:nvCxnSpPr>
+          <p:cNvPr id="29" name="Gerade Verbindung mit Pfeil 28">
+            <a:extLst>
+              <a:ext uri="{FF2B5EF4-FFF2-40B4-BE49-F238E27FC236}">
+                <a16:creationId xmlns:a16="http://schemas.microsoft.com/office/drawing/2014/main" id="{10E4147F-C427-4CA2-B21D-DBC1076041DD}"/>
+              </a:ext>
+            </a:extLst>
+          </p:cNvPr>
+          <p:cNvCxnSpPr>
+            <a:cxnSpLocks/>
+            <a:stCxn id="27" idx="6"/>
+            <a:endCxn id="44" idx="2"/>
+          </p:cNvCxnSpPr>
+          <p:nvPr/>
+        </p:nvCxnSpPr>
+        <p:spPr>
+          <a:xfrm flipV="1">
+            <a:off x="2968917" y="3400069"/>
+            <a:ext cx="349884" cy="356151"/>
           </a:xfrm>
           <a:prstGeom prst="straightConnector1">
             <a:avLst/>
@@ -8499,6 +8547,60 @@
                                         </p:cTn>
                                         <p:tgtEl>
                                           <p:spTgt spid="56"/>
+                                        </p:tgtEl>
+                                        <p:attrNameLst>
+                                          <p:attrName>style.visibility</p:attrName>
+                                        </p:attrNameLst>
+                                      </p:cBhvr>
+                                      <p:to>
+                                        <p:strVal val="visible"/>
+                                      </p:to>
+                                    </p:set>
+                                  </p:childTnLst>
+                                </p:cTn>
+                              </p:par>
+                              <p:par>
+                                <p:cTn id="59" presetID="1" presetClass="entr" presetSubtype="0" fill="hold" nodeType="withEffect">
+                                  <p:stCondLst>
+                                    <p:cond delay="0"/>
+                                  </p:stCondLst>
+                                  <p:childTnLst>
+                                    <p:set>
+                                      <p:cBhvr>
+                                        <p:cTn id="60" dur="1" fill="hold">
+                                          <p:stCondLst>
+                                            <p:cond delay="0"/>
+                                          </p:stCondLst>
+                                        </p:cTn>
+                                        <p:tgtEl>
+                                          <p:spTgt spid="29"/>
+                                        </p:tgtEl>
+                                        <p:attrNameLst>
+                                          <p:attrName>style.visibility</p:attrName>
+                                        </p:attrNameLst>
+                                      </p:cBhvr>
+                                      <p:to>
+                                        <p:strVal val="visible"/>
+                                      </p:to>
+                                    </p:set>
+                                  </p:childTnLst>
+                                </p:cTn>
+                              </p:par>
+                              <p:par>
+                                <p:cTn id="61" presetID="1" presetClass="entr" presetSubtype="0" fill="hold" nodeType="withEffect">
+                                  <p:stCondLst>
+                                    <p:cond delay="0"/>
+                                  </p:stCondLst>
+                                  <p:childTnLst>
+                                    <p:set>
+                                      <p:cBhvr>
+                                        <p:cTn id="62" dur="1" fill="hold">
+                                          <p:stCondLst>
+                                            <p:cond delay="0"/>
+                                          </p:stCondLst>
+                                        </p:cTn>
+                                        <p:tgtEl>
+                                          <p:spTgt spid="29"/>
                                         </p:tgtEl>
                                         <p:attrNameLst>
                                           <p:attrName>style.visibility</p:attrName>

</xml_diff>